<commit_message>
added note about AfterEach
</commit_message>
<xml_diff>
--- a/Slides/Module 02 From Requirements to Code.pptx
+++ b/Slides/Module 02 From Requirements to Code.pptx
@@ -1372,30 +1372,6 @@
     </pc:docChg>
   </pc:docChgLst>
   <pc:docChgLst>
-    <pc:chgData name="Mitchell Wand" userId="de9b44c55c049659" providerId="LiveId" clId="{ACA31533-D7E5-4647-92CA-20F092EE7CE8}"/>
-    <pc:docChg chg="modSld">
-      <pc:chgData name="Mitchell Wand" userId="de9b44c55c049659" providerId="LiveId" clId="{ACA31533-D7E5-4647-92CA-20F092EE7CE8}" dt="2022-08-31T01:50:01.528" v="0" actId="20577"/>
-      <pc:docMkLst>
-        <pc:docMk/>
-      </pc:docMkLst>
-      <pc:sldChg chg="modSp mod">
-        <pc:chgData name="Mitchell Wand" userId="de9b44c55c049659" providerId="LiveId" clId="{ACA31533-D7E5-4647-92CA-20F092EE7CE8}" dt="2022-08-31T01:50:01.528" v="0" actId="20577"/>
-        <pc:sldMkLst>
-          <pc:docMk/>
-          <pc:sldMk cId="3025610200" sldId="485"/>
-        </pc:sldMkLst>
-        <pc:spChg chg="mod">
-          <ac:chgData name="Mitchell Wand" userId="de9b44c55c049659" providerId="LiveId" clId="{ACA31533-D7E5-4647-92CA-20F092EE7CE8}" dt="2022-08-31T01:50:01.528" v="0" actId="20577"/>
-          <ac:spMkLst>
-            <pc:docMk/>
-            <pc:sldMk cId="3025610200" sldId="485"/>
-            <ac:spMk id="8" creationId="{5B356C44-32EB-4AC4-94B7-A86895491E70}"/>
-          </ac:spMkLst>
-        </pc:spChg>
-      </pc:sldChg>
-    </pc:docChg>
-  </pc:docChgLst>
-  <pc:docChgLst>
     <pc:chgData name="Mitchell Wand" userId="de9b44c55c049659" providerId="LiveId" clId="{2CEF4DC6-0291-4031-B743-2034250D9D86}"/>
     <pc:docChg chg="undo custSel modSld">
       <pc:chgData name="Mitchell Wand" userId="de9b44c55c049659" providerId="LiveId" clId="{2CEF4DC6-0291-4031-B743-2034250D9D86}" dt="2024-08-13T20:46:45.494" v="620" actId="20577"/>
@@ -1453,6 +1429,30 @@
       </pc:sldChg>
     </pc:docChg>
   </pc:docChgLst>
+  <pc:docChgLst>
+    <pc:chgData name="Mitchell Wand" userId="de9b44c55c049659" providerId="LiveId" clId="{ACA31533-D7E5-4647-92CA-20F092EE7CE8}"/>
+    <pc:docChg chg="modSld">
+      <pc:chgData name="Mitchell Wand" userId="de9b44c55c049659" providerId="LiveId" clId="{ACA31533-D7E5-4647-92CA-20F092EE7CE8}" dt="2022-08-31T01:50:01.528" v="0" actId="20577"/>
+      <pc:docMkLst>
+        <pc:docMk/>
+      </pc:docMkLst>
+      <pc:sldChg chg="modSp mod">
+        <pc:chgData name="Mitchell Wand" userId="de9b44c55c049659" providerId="LiveId" clId="{ACA31533-D7E5-4647-92CA-20F092EE7CE8}" dt="2022-08-31T01:50:01.528" v="0" actId="20577"/>
+        <pc:sldMkLst>
+          <pc:docMk/>
+          <pc:sldMk cId="3025610200" sldId="485"/>
+        </pc:sldMkLst>
+        <pc:spChg chg="mod">
+          <ac:chgData name="Mitchell Wand" userId="de9b44c55c049659" providerId="LiveId" clId="{ACA31533-D7E5-4647-92CA-20F092EE7CE8}" dt="2022-08-31T01:50:01.528" v="0" actId="20577"/>
+          <ac:spMkLst>
+            <pc:docMk/>
+            <pc:sldMk cId="3025610200" sldId="485"/>
+            <ac:spMk id="8" creationId="{5B356C44-32EB-4AC4-94B7-A86895491E70}"/>
+          </ac:spMkLst>
+        </pc:spChg>
+      </pc:sldChg>
+    </pc:docChg>
+  </pc:docChgLst>
 </pc:chgInfo>
 </file>
 
@@ -1538,7 +1538,7 @@
           <a:p>
             <a:fld id="{7C7E5181-6CF5-45F7-A87A-E0E0B1FD7549}" type="datetimeFigureOut">
               <a:rPr lang="en-US" smtClean="0"/>
-              <a:t>12/21/2024</a:t>
+              <a:t>1/1/2025</a:t>
             </a:fld>
             <a:endParaRPr lang="en-US"/>
           </a:p>
@@ -3308,7 +3308,42 @@
           <a:bodyPr/>
           <a:lstStyle/>
           <a:p>
-            <a:endParaRPr lang="en-US" dirty="0"/>
+            <a:r>
+              <a:rPr lang="en-US" dirty="0"/>
+              <a:t>Here we didn't need an </a:t>
+            </a:r>
+            <a:r>
+              <a:rPr lang="en-US" dirty="0" err="1"/>
+              <a:t>afterEach</a:t>
+            </a:r>
+            <a:r>
+              <a:rPr lang="en-US" dirty="0"/>
+              <a:t>, because the </a:t>
+            </a:r>
+            <a:r>
+              <a:rPr lang="en-US" dirty="0" err="1"/>
+              <a:t>beforeEach</a:t>
+            </a:r>
+            <a:r>
+              <a:rPr lang="en-US" dirty="0"/>
+              <a:t> re-initializes the database.  If the </a:t>
+            </a:r>
+            <a:r>
+              <a:rPr lang="en-US" dirty="0" err="1"/>
+              <a:t>beforeEach</a:t>
+            </a:r>
+            <a:r>
+              <a:rPr lang="en-US" dirty="0"/>
+              <a:t> did things like connect to a database, then you'd need an </a:t>
+            </a:r>
+            <a:r>
+              <a:rPr lang="en-US" dirty="0" err="1"/>
+              <a:t>afterEach</a:t>
+            </a:r>
+            <a:r>
+              <a:rPr lang="en-US" dirty="0"/>
+              <a:t> to disconnect.</a:t>
+            </a:r>
           </a:p>
         </p:txBody>
       </p:sp>
@@ -4678,7 +4713,7 @@
           <a:p>
             <a:fld id="{5D2A64DE-480B-420F-9649-4F8E696E08E0}" type="datetime1">
               <a:rPr lang="en-US" smtClean="0"/>
-              <a:t>12/21/2024</a:t>
+              <a:t>1/1/2025</a:t>
             </a:fld>
             <a:endParaRPr lang="en-US"/>
           </a:p>
@@ -5002,7 +5037,7 @@
           <a:p>
             <a:fld id="{EA476A42-A091-4468-A075-64A31BE59948}" type="datetime1">
               <a:rPr lang="en-US" smtClean="0"/>
-              <a:t>12/21/2024</a:t>
+              <a:t>1/1/2025</a:t>
             </a:fld>
             <a:endParaRPr lang="en-US"/>
           </a:p>
@@ -5200,7 +5235,7 @@
           <a:p>
             <a:fld id="{0D3616D0-8311-4107-9726-6B805E7D05BA}" type="datetime1">
               <a:rPr lang="en-US" smtClean="0"/>
-              <a:t>12/21/2024</a:t>
+              <a:t>1/1/2025</a:t>
             </a:fld>
             <a:endParaRPr lang="en-US"/>
           </a:p>
@@ -5408,7 +5443,7 @@
           <a:p>
             <a:fld id="{3BC2557A-5C88-417A-A763-5AC779462A5F}" type="datetime1">
               <a:rPr lang="en-US" smtClean="0"/>
-              <a:t>12/21/2024</a:t>
+              <a:t>1/1/2025</a:t>
             </a:fld>
             <a:endParaRPr lang="en-US"/>
           </a:p>
@@ -5932,7 +5967,7 @@
           <a:p>
             <a:fld id="{07C7BFD4-467E-4EDE-93EA-052F5B39A4E5}" type="datetime1">
               <a:rPr lang="en-US" smtClean="0"/>
-              <a:t>12/21/2024</a:t>
+              <a:t>1/1/2025</a:t>
             </a:fld>
             <a:endParaRPr lang="en-US"/>
           </a:p>
@@ -6182,7 +6217,7 @@
           <a:p>
             <a:fld id="{07C7BFD4-467E-4EDE-93EA-052F5B39A4E5}" type="datetime1">
               <a:rPr lang="en-US" smtClean="0"/>
-              <a:t>12/21/2024</a:t>
+              <a:t>1/1/2025</a:t>
             </a:fld>
             <a:endParaRPr lang="en-US"/>
           </a:p>
@@ -6364,7 +6399,7 @@
           <a:p>
             <a:fld id="{109E55A0-C911-4F03-82FC-7E5926047D46}" type="datetime1">
               <a:rPr lang="en-US" smtClean="0"/>
-              <a:t>12/21/2024</a:t>
+              <a:t>1/1/2025</a:t>
             </a:fld>
             <a:endParaRPr lang="en-US"/>
           </a:p>
@@ -6677,7 +6712,7 @@
           <a:p>
             <a:fld id="{A533CBE2-D5BE-47AC-ADC2-9CDFC1D0CF90}" type="datetime1">
               <a:rPr lang="en-US" smtClean="0"/>
-              <a:t>12/21/2024</a:t>
+              <a:t>1/1/2025</a:t>
             </a:fld>
             <a:endParaRPr lang="en-US"/>
           </a:p>
@@ -6978,7 +7013,7 @@
           <a:p>
             <a:fld id="{39B7EDB1-CE74-4951-85A2-0B01C2128E28}" type="datetime1">
               <a:rPr lang="en-US" smtClean="0"/>
-              <a:t>12/21/2024</a:t>
+              <a:t>1/1/2025</a:t>
             </a:fld>
             <a:endParaRPr lang="en-US"/>
           </a:p>
@@ -7426,7 +7461,7 @@
           <a:p>
             <a:fld id="{2BC7EB92-A5C2-4807-A9DC-9EDE6CBFB241}" type="datetime1">
               <a:rPr lang="en-US" smtClean="0"/>
-              <a:t>12/21/2024</a:t>
+              <a:t>1/1/2025</a:t>
             </a:fld>
             <a:endParaRPr lang="en-US"/>
           </a:p>
@@ -7539,7 +7574,7 @@
           <a:p>
             <a:fld id="{2B7B7EE0-7771-4CD5-9B2B-3550753A54A1}" type="datetime1">
               <a:rPr lang="en-US" smtClean="0"/>
-              <a:t>12/21/2024</a:t>
+              <a:t>1/1/2025</a:t>
             </a:fld>
             <a:endParaRPr lang="en-US"/>
           </a:p>
@@ -7850,7 +7885,7 @@
           <a:p>
             <a:fld id="{F8B318B3-0E87-4416-A9B8-D891968C2727}" type="datetime1">
               <a:rPr lang="en-US" smtClean="0"/>
-              <a:t>12/21/2024</a:t>
+              <a:t>1/1/2025</a:t>
             </a:fld>
             <a:endParaRPr lang="en-US"/>
           </a:p>
@@ -8091,7 +8126,7 @@
           <a:p>
             <a:fld id="{54D997E8-DDEE-43F1-8D9B-F8A1E11DE488}" type="datetime1">
               <a:rPr lang="en-US" smtClean="0"/>
-              <a:t>12/21/2024</a:t>
+              <a:t>1/1/2025</a:t>
             </a:fld>
             <a:endParaRPr lang="en-US"/>
           </a:p>

</xml_diff>